<commit_message>
fixed typo update readme
</commit_message>
<xml_diff>
--- a/intro_to_brms.pptx
+++ b/intro_to_brms.pptx
@@ -261,7 +261,7 @@
           <a:p>
             <a:fld id="{23B88268-2E67-48A3-82C0-FDDAC97966ED}" type="datetimeFigureOut">
               <a:rPr lang="en-US" smtClean="0"/>
-              <a:t>05-Jul-19</a:t>
+              <a:t>08-Jul-19</a:t>
             </a:fld>
             <a:endParaRPr lang="en-US"/>
           </a:p>
@@ -760,7 +760,7 @@
           <a:p>
             <a:fld id="{CA2C1D64-8603-4654-9C66-AA8C50C45F72}" type="datetimeFigureOut">
               <a:rPr lang="en-US" smtClean="0"/>
-              <a:t>05-Jul-19</a:t>
+              <a:t>08-Jul-19</a:t>
             </a:fld>
             <a:endParaRPr lang="en-US"/>
           </a:p>
@@ -958,7 +958,7 @@
           <a:p>
             <a:fld id="{CA2C1D64-8603-4654-9C66-AA8C50C45F72}" type="datetimeFigureOut">
               <a:rPr lang="en-US" smtClean="0"/>
-              <a:t>05-Jul-19</a:t>
+              <a:t>08-Jul-19</a:t>
             </a:fld>
             <a:endParaRPr lang="en-US"/>
           </a:p>
@@ -1166,7 +1166,7 @@
           <a:p>
             <a:fld id="{CA2C1D64-8603-4654-9C66-AA8C50C45F72}" type="datetimeFigureOut">
               <a:rPr lang="en-US" smtClean="0"/>
-              <a:t>05-Jul-19</a:t>
+              <a:t>08-Jul-19</a:t>
             </a:fld>
             <a:endParaRPr lang="en-US"/>
           </a:p>
@@ -1364,7 +1364,7 @@
           <a:p>
             <a:fld id="{CA2C1D64-8603-4654-9C66-AA8C50C45F72}" type="datetimeFigureOut">
               <a:rPr lang="en-US" smtClean="0"/>
-              <a:t>05-Jul-19</a:t>
+              <a:t>08-Jul-19</a:t>
             </a:fld>
             <a:endParaRPr lang="en-US"/>
           </a:p>
@@ -1639,7 +1639,7 @@
           <a:p>
             <a:fld id="{CA2C1D64-8603-4654-9C66-AA8C50C45F72}" type="datetimeFigureOut">
               <a:rPr lang="en-US" smtClean="0"/>
-              <a:t>05-Jul-19</a:t>
+              <a:t>08-Jul-19</a:t>
             </a:fld>
             <a:endParaRPr lang="en-US"/>
           </a:p>
@@ -1904,7 +1904,7 @@
           <a:p>
             <a:fld id="{CA2C1D64-8603-4654-9C66-AA8C50C45F72}" type="datetimeFigureOut">
               <a:rPr lang="en-US" smtClean="0"/>
-              <a:t>05-Jul-19</a:t>
+              <a:t>08-Jul-19</a:t>
             </a:fld>
             <a:endParaRPr lang="en-US"/>
           </a:p>
@@ -2316,7 +2316,7 @@
           <a:p>
             <a:fld id="{CA2C1D64-8603-4654-9C66-AA8C50C45F72}" type="datetimeFigureOut">
               <a:rPr lang="en-US" smtClean="0"/>
-              <a:t>05-Jul-19</a:t>
+              <a:t>08-Jul-19</a:t>
             </a:fld>
             <a:endParaRPr lang="en-US"/>
           </a:p>
@@ -2457,7 +2457,7 @@
           <a:p>
             <a:fld id="{CA2C1D64-8603-4654-9C66-AA8C50C45F72}" type="datetimeFigureOut">
               <a:rPr lang="en-US" smtClean="0"/>
-              <a:t>05-Jul-19</a:t>
+              <a:t>08-Jul-19</a:t>
             </a:fld>
             <a:endParaRPr lang="en-US"/>
           </a:p>
@@ -2570,7 +2570,7 @@
           <a:p>
             <a:fld id="{CA2C1D64-8603-4654-9C66-AA8C50C45F72}" type="datetimeFigureOut">
               <a:rPr lang="en-US" smtClean="0"/>
-              <a:t>05-Jul-19</a:t>
+              <a:t>08-Jul-19</a:t>
             </a:fld>
             <a:endParaRPr lang="en-US"/>
           </a:p>
@@ -2881,7 +2881,7 @@
           <a:p>
             <a:fld id="{CA2C1D64-8603-4654-9C66-AA8C50C45F72}" type="datetimeFigureOut">
               <a:rPr lang="en-US" smtClean="0"/>
-              <a:t>05-Jul-19</a:t>
+              <a:t>08-Jul-19</a:t>
             </a:fld>
             <a:endParaRPr lang="en-US"/>
           </a:p>
@@ -3169,7 +3169,7 @@
           <a:p>
             <a:fld id="{CA2C1D64-8603-4654-9C66-AA8C50C45F72}" type="datetimeFigureOut">
               <a:rPr lang="en-US" smtClean="0"/>
-              <a:t>05-Jul-19</a:t>
+              <a:t>08-Jul-19</a:t>
             </a:fld>
             <a:endParaRPr lang="en-US"/>
           </a:p>
@@ -3410,7 +3410,7 @@
           <a:p>
             <a:fld id="{CA2C1D64-8603-4654-9C66-AA8C50C45F72}" type="datetimeFigureOut">
               <a:rPr lang="en-US" smtClean="0"/>
-              <a:t>05-Jul-19</a:t>
+              <a:t>08-Jul-19</a:t>
             </a:fld>
             <a:endParaRPr lang="en-US"/>
           </a:p>
@@ -20539,15 +20539,7 @@
             </a:r>
             <a:r>
               <a:rPr lang="en-US" dirty="0"/>
-              <a:t> here (Barr, Levy, </a:t>
-            </a:r>
-            <a:r>
-              <a:rPr lang="en-US" dirty="0" err="1"/>
-              <a:t>Schepers</a:t>
-            </a:r>
-            <a:r>
-              <a:rPr lang="en-US" dirty="0"/>
-              <a:t>, &amp; </a:t>
+              <a:t> here (Barr, Levy, Scheepers, &amp; </a:t>
             </a:r>
             <a:r>
               <a:rPr lang="en-US" dirty="0" err="1"/>

</xml_diff>